<commit_message>
iris and gapminder, rmarkdown template
</commit_message>
<xml_diff>
--- a/test-rmarkdown.pptx
+++ b/test-rmarkdown.pptx
@@ -3185,7 +3185,7 @@
             </a:pPr>
             <a:r>
               <a:rPr/>
-              <a:t>2022-12-16</a:t>
+              <a:t>2022-12-17</a:t>
             </a:r>
           </a:p>
         </p:txBody>
@@ -3355,16 +3355,19 @@
               <a:t>output:
   html_notebook:
     number_sections: yes
-  word_document: default
-  beamer_presentation: default
-  powerpoint_presentation: default
   html_document:
     df_print: paged
+    number_sections: yes
+  word_document: 
+    number_sections: yes
+  pdf_document: 
+    number_sections: yes
+  powerpoint_presentation: default
   ioslides_presentation:
     widescreen: yes
     smaller: yes
   slidy_presentation: default
-  pdf_document: default</a:t>
+  beamer_presentation: default</a:t>
             </a:r>
           </a:p>
         </p:txBody>
@@ -3628,7 +3631,7 @@
             <a:pPr lvl="0"/>
             <a:r>
               <a:rPr/>
-              <a:t>Post error message to web search engine.</a:t>
+              <a:t>Post error messages to a web search engine.</a:t>
             </a:r>
           </a:p>
         </p:txBody>

</xml_diff>